<commit_message>
Added clustering and PCA
</commit_message>
<xml_diff>
--- a/presentations/pptx/04-Building tidy functions.pptx
+++ b/presentations/pptx/04-Building tidy functions.pptx
@@ -5,16 +5,17 @@
     <p:sldMasterId id="2147483840" r:id="rId1"/>
   </p:sldMasterIdLst>
   <p:notesMasterIdLst>
-    <p:notesMasterId r:id="rId9"/>
+    <p:notesMasterId r:id="rId10"/>
   </p:notesMasterIdLst>
   <p:sldIdLst>
     <p:sldId id="256" r:id="rId2"/>
-    <p:sldId id="267" r:id="rId3"/>
-    <p:sldId id="270" r:id="rId4"/>
-    <p:sldId id="269" r:id="rId5"/>
-    <p:sldId id="271" r:id="rId6"/>
-    <p:sldId id="272" r:id="rId7"/>
-    <p:sldId id="268" r:id="rId8"/>
+    <p:sldId id="273" r:id="rId3"/>
+    <p:sldId id="267" r:id="rId4"/>
+    <p:sldId id="270" r:id="rId5"/>
+    <p:sldId id="269" r:id="rId6"/>
+    <p:sldId id="271" r:id="rId7"/>
+    <p:sldId id="272" r:id="rId8"/>
+    <p:sldId id="268" r:id="rId9"/>
   </p:sldIdLst>
   <p:sldSz cx="12192000" cy="6858000"/>
   <p:notesSz cx="6858000" cy="9144000"/>
@@ -214,7 +215,7 @@
           <a:p>
             <a:fld id="{5C93CA8F-50F8-44B5-B48F-4C4452AC4FCB}" type="datetimeFigureOut">
               <a:rPr lang="he-IL" smtClean="0"/>
-              <a:t>כ"ד/אדר ב/תשע"ט</a:t>
+              <a:t>ב'/ניסן/תשע"ט</a:t>
             </a:fld>
             <a:endParaRPr lang="he-IL"/>
           </a:p>
@@ -547,7 +548,7 @@
           <a:p>
             <a:fld id="{C4276747-8356-4D8F-84BF-3C530C5DAF39}" type="slidenum">
               <a:rPr lang="he-IL" smtClean="0"/>
-              <a:t>3</a:t>
+              <a:t>4</a:t>
             </a:fld>
             <a:endParaRPr lang="he-IL"/>
           </a:p>
@@ -971,7 +972,7 @@
           <a:p>
             <a:fld id="{808B8BE7-FA93-462E-91E9-54E26C408D98}" type="datetime6">
               <a:rPr lang="en-US" smtClean="0"/>
-              <a:t>March 19</a:t>
+              <a:t>April 19</a:t>
             </a:fld>
             <a:endParaRPr lang="en-US" dirty="0"/>
           </a:p>
@@ -1204,7 +1205,7 @@
           <a:p>
             <a:fld id="{0D82CCDA-FC2D-4BA5-90E3-739DC6ED4C30}" type="datetime6">
               <a:rPr lang="en-US" smtClean="0"/>
-              <a:t>March 19</a:t>
+              <a:t>April 19</a:t>
             </a:fld>
             <a:endParaRPr lang="en-US" dirty="0"/>
           </a:p>
@@ -1383,7 +1384,7 @@
           <a:p>
             <a:fld id="{8F88DA83-5073-4626-B6B8-E91A24F45A53}" type="datetime6">
               <a:rPr lang="en-US" smtClean="0"/>
-              <a:t>March 19</a:t>
+              <a:t>April 19</a:t>
             </a:fld>
             <a:endParaRPr lang="en-US" dirty="0"/>
           </a:p>
@@ -1552,7 +1553,7 @@
           <a:p>
             <a:fld id="{EEBDCC4F-2BAB-4EBD-BBEA-01B8D436681A}" type="datetime6">
               <a:rPr lang="en-US" smtClean="0"/>
-              <a:t>March 19</a:t>
+              <a:t>April 19</a:t>
             </a:fld>
             <a:endParaRPr lang="en-US" dirty="0"/>
           </a:p>
@@ -1876,7 +1877,7 @@
           <a:p>
             <a:fld id="{79487F88-0456-4CDE-8B89-4A78647F618A}" type="datetime6">
               <a:rPr lang="en-US" smtClean="0"/>
-              <a:t>March 19</a:t>
+              <a:t>April 19</a:t>
             </a:fld>
             <a:endParaRPr lang="en-US" dirty="0"/>
           </a:p>
@@ -2326,7 +2327,7 @@
           <a:p>
             <a:fld id="{9136D32D-E4FB-4AA6-8422-EE667E33FFC1}" type="datetime6">
               <a:rPr lang="en-US" smtClean="0"/>
-              <a:t>March 19</a:t>
+              <a:t>April 19</a:t>
             </a:fld>
             <a:endParaRPr lang="en-US" dirty="0"/>
           </a:p>
@@ -2759,7 +2760,7 @@
           <a:p>
             <a:fld id="{3AB3EC8A-F822-46B6-826B-CC266009A74B}" type="datetime6">
               <a:rPr lang="en-US" smtClean="0"/>
-              <a:t>March 19</a:t>
+              <a:t>April 19</a:t>
             </a:fld>
             <a:endParaRPr lang="en-US" dirty="0"/>
           </a:p>
@@ -2876,7 +2877,7 @@
           <a:p>
             <a:fld id="{514A54EB-9E75-485B-93FC-08837C33F6A9}" type="datetime6">
               <a:rPr lang="en-US" smtClean="0"/>
-              <a:t>March 19</a:t>
+              <a:t>April 19</a:t>
             </a:fld>
             <a:endParaRPr lang="en-US" dirty="0"/>
           </a:p>
@@ -2970,7 +2971,7 @@
           <a:p>
             <a:fld id="{4187F57E-3EB2-4425-B7C6-E80F41215C16}" type="datetime6">
               <a:rPr lang="en-US" smtClean="0"/>
-              <a:t>March 19</a:t>
+              <a:t>April 19</a:t>
             </a:fld>
             <a:endParaRPr lang="en-US" dirty="0"/>
           </a:p>
@@ -3319,7 +3320,7 @@
           <a:p>
             <a:fld id="{C0AA945B-18EE-4367-BA0C-8D19048BCABE}" type="datetime6">
               <a:rPr lang="en-US" smtClean="0"/>
-              <a:t>March 19</a:t>
+              <a:t>April 19</a:t>
             </a:fld>
             <a:endParaRPr lang="en-US" dirty="0"/>
           </a:p>
@@ -3807,7 +3808,7 @@
           <a:p>
             <a:fld id="{F5D71FBB-8CD4-4D0A-B8C4-65C60609C705}" type="datetime6">
               <a:rPr lang="en-US" smtClean="0"/>
-              <a:t>March 19</a:t>
+              <a:t>April 19</a:t>
             </a:fld>
             <a:endParaRPr lang="en-US" dirty="0"/>
           </a:p>
@@ -4139,7 +4140,7 @@
           <a:p>
             <a:fld id="{CB7DA022-A739-4269-87CF-EB9B0BE787C4}" type="datetime6">
               <a:rPr lang="en-US" smtClean="0"/>
-              <a:t>March 19</a:t>
+              <a:t>April 19</a:t>
             </a:fld>
             <a:endParaRPr lang="en-US" dirty="0"/>
           </a:p>
@@ -4874,6 +4875,232 @@
       </p:grpSpPr>
       <p:sp>
         <p:nvSpPr>
+          <p:cNvPr id="2" name="Title 1"/>
+          <p:cNvSpPr>
+            <a:spLocks noGrp="1"/>
+          </p:cNvSpPr>
+          <p:nvPr>
+            <p:ph type="title"/>
+          </p:nvPr>
+        </p:nvSpPr>
+        <p:spPr/>
+        <p:txBody>
+          <a:bodyPr/>
+          <a:lstStyle/>
+          <a:p>
+            <a:r>
+              <a:rPr lang="en-US" dirty="0" smtClean="0"/>
+              <a:t>Recap</a:t>
+            </a:r>
+            <a:endParaRPr lang="he-IL" dirty="0"/>
+          </a:p>
+        </p:txBody>
+      </p:sp>
+      <p:sp>
+        <p:nvSpPr>
+          <p:cNvPr id="3" name="Content Placeholder 2"/>
+          <p:cNvSpPr>
+            <a:spLocks noGrp="1"/>
+          </p:cNvSpPr>
+          <p:nvPr>
+            <p:ph idx="1"/>
+          </p:nvPr>
+        </p:nvSpPr>
+        <p:spPr/>
+        <p:txBody>
+          <a:bodyPr/>
+          <a:lstStyle/>
+          <a:p>
+            <a:r>
+              <a:rPr lang="en-US" dirty="0" smtClean="0"/>
+              <a:t>We saw how to batch generate parametrized </a:t>
+            </a:r>
+            <a:r>
+              <a:rPr lang="en-US" dirty="0" err="1" smtClean="0"/>
+              <a:t>Rmarkdown</a:t>
+            </a:r>
+            <a:r>
+              <a:rPr lang="en-US" dirty="0" smtClean="0"/>
+              <a:t> reports</a:t>
+            </a:r>
+          </a:p>
+          <a:p>
+            <a:r>
+              <a:rPr lang="en-US" dirty="0" smtClean="0"/>
+              <a:t>We talked about </a:t>
+            </a:r>
+            <a:r>
+              <a:rPr lang="en-US" dirty="0" err="1" smtClean="0"/>
+              <a:t>tidyverse</a:t>
+            </a:r>
+            <a:r>
+              <a:rPr lang="en-US" dirty="0" smtClean="0"/>
+              <a:t>: </a:t>
+            </a:r>
+          </a:p>
+          <a:p>
+            <a:pPr lvl="1"/>
+            <a:r>
+              <a:rPr lang="en-US" dirty="0" smtClean="0"/>
+              <a:t>reshaping data w/ spread &amp; gather</a:t>
+            </a:r>
+          </a:p>
+          <a:p>
+            <a:pPr lvl="1"/>
+            <a:r>
+              <a:rPr lang="en-US" dirty="0" smtClean="0"/>
+              <a:t>using </a:t>
+            </a:r>
+            <a:r>
+              <a:rPr lang="en-US" dirty="0" err="1" smtClean="0"/>
+              <a:t>mutate_at</a:t>
+            </a:r>
+            <a:r>
+              <a:rPr lang="en-US" dirty="0" smtClean="0"/>
+              <a:t>, </a:t>
+            </a:r>
+            <a:r>
+              <a:rPr lang="en-US" dirty="0" err="1" smtClean="0"/>
+              <a:t>mutate_if</a:t>
+            </a:r>
+            <a:r>
+              <a:rPr lang="en-US" dirty="0" smtClean="0"/>
+              <a:t>, </a:t>
+            </a:r>
+            <a:r>
+              <a:rPr lang="en-US" dirty="0" err="1" smtClean="0"/>
+              <a:t>mutate_all</a:t>
+            </a:r>
+            <a:endParaRPr lang="en-US" dirty="0"/>
+          </a:p>
+          <a:p>
+            <a:pPr lvl="1"/>
+            <a:r>
+              <a:rPr lang="en-US" dirty="0" smtClean="0"/>
+              <a:t>similar summarize_*, rename_*</a:t>
+            </a:r>
+          </a:p>
+          <a:p>
+            <a:r>
+              <a:rPr lang="en-US" b="1" dirty="0" smtClean="0"/>
+              <a:t>A few notes on…</a:t>
+            </a:r>
+            <a:endParaRPr lang="en-US" b="1" dirty="0"/>
+          </a:p>
+          <a:p>
+            <a:pPr lvl="1"/>
+            <a:r>
+              <a:rPr lang="en-US" dirty="0" smtClean="0"/>
+              <a:t>gather’s </a:t>
+            </a:r>
+            <a:r>
+              <a:rPr lang="en-US" dirty="0"/>
+              <a:t>third argument</a:t>
+            </a:r>
+          </a:p>
+          <a:p>
+            <a:pPr lvl="1"/>
+            <a:r>
+              <a:rPr lang="en-US" dirty="0"/>
+              <a:t>using list</a:t>
+            </a:r>
+            <a:r>
+              <a:rPr lang="en-US" dirty="0" smtClean="0"/>
+              <a:t>(~f) </a:t>
+            </a:r>
+            <a:r>
+              <a:rPr lang="en-US" dirty="0"/>
+              <a:t>instead of </a:t>
+            </a:r>
+            <a:r>
+              <a:rPr lang="en-US" dirty="0" smtClean="0"/>
+              <a:t>funs(f)</a:t>
+            </a:r>
+            <a:endParaRPr lang="he-IL" dirty="0"/>
+          </a:p>
+          <a:p>
+            <a:endParaRPr lang="he-IL" dirty="0"/>
+          </a:p>
+        </p:txBody>
+      </p:sp>
+      <p:sp>
+        <p:nvSpPr>
+          <p:cNvPr id="4" name="Footer Placeholder 3"/>
+          <p:cNvSpPr>
+            <a:spLocks noGrp="1"/>
+          </p:cNvSpPr>
+          <p:nvPr>
+            <p:ph type="ftr" sz="quarter" idx="11"/>
+          </p:nvPr>
+        </p:nvSpPr>
+        <p:spPr/>
+        <p:txBody>
+          <a:bodyPr/>
+          <a:lstStyle/>
+          <a:p>
+            <a:r>
+              <a:rPr lang="en-US" smtClean="0"/>
+              <a:t>Materials by Adi Sarid https://adisarid.github.io and http://www.sarid-ins.com</a:t>
+            </a:r>
+            <a:endParaRPr lang="en-US" dirty="0"/>
+          </a:p>
+        </p:txBody>
+      </p:sp>
+      <p:sp>
+        <p:nvSpPr>
+          <p:cNvPr id="5" name="Slide Number Placeholder 4"/>
+          <p:cNvSpPr>
+            <a:spLocks noGrp="1"/>
+          </p:cNvSpPr>
+          <p:nvPr>
+            <p:ph type="sldNum" sz="quarter" idx="12"/>
+          </p:nvPr>
+        </p:nvSpPr>
+        <p:spPr/>
+        <p:txBody>
+          <a:bodyPr/>
+          <a:lstStyle/>
+          <a:p>
+            <a:fld id="{4FAB73BC-B049-4115-A692-8D63A059BFB8}" type="slidenum">
+              <a:rPr lang="en-US" smtClean="0"/>
+              <a:t>2</a:t>
+            </a:fld>
+            <a:endParaRPr lang="en-US" dirty="0"/>
+          </a:p>
+        </p:txBody>
+      </p:sp>
+    </p:spTree>
+    <p:extLst>
+      <p:ext uri="{BB962C8B-B14F-4D97-AF65-F5344CB8AC3E}">
+        <p14:creationId xmlns:p14="http://schemas.microsoft.com/office/powerpoint/2010/main" val="2158577354"/>
+      </p:ext>
+    </p:extLst>
+  </p:cSld>
+  <p:clrMapOvr>
+    <a:masterClrMapping/>
+  </p:clrMapOvr>
+</p:sld>
+</file>
+
+<file path=ppt/slides/slide3.xml><?xml version="1.0" encoding="utf-8"?>
+<p:sld xmlns:a="http://schemas.openxmlformats.org/drawingml/2006/main" xmlns:r="http://schemas.openxmlformats.org/officeDocument/2006/relationships" xmlns:p="http://schemas.openxmlformats.org/presentationml/2006/main">
+  <p:cSld>
+    <p:spTree>
+      <p:nvGrpSpPr>
+        <p:cNvPr id="1" name=""/>
+        <p:cNvGrpSpPr/>
+        <p:nvPr/>
+      </p:nvGrpSpPr>
+      <p:grpSpPr>
+        <a:xfrm>
+          <a:off x="0" y="0"/>
+          <a:ext cx="0" cy="0"/>
+          <a:chOff x="0" y="0"/>
+          <a:chExt cx="0" cy="0"/>
+        </a:xfrm>
+      </p:grpSpPr>
+      <p:sp>
+        <p:nvSpPr>
           <p:cNvPr id="2" name="Title 1">
             <a:extLst>
               <a:ext uri="{FF2B5EF4-FFF2-40B4-BE49-F238E27FC236}">
@@ -5132,7 +5359,7 @@
           <a:p>
             <a:fld id="{4FAB73BC-B049-4115-A692-8D63A059BFB8}" type="slidenum">
               <a:rPr lang="en-US" smtClean="0"/>
-              <a:t>2</a:t>
+              <a:t>3</a:t>
             </a:fld>
             <a:endParaRPr lang="en-US" dirty="0"/>
           </a:p>
@@ -5357,363 +5584,6 @@
 </p:sld>
 </file>
 
-<file path=ppt/slides/slide3.xml><?xml version="1.0" encoding="utf-8"?>
-<p:sld xmlns:a="http://schemas.openxmlformats.org/drawingml/2006/main" xmlns:r="http://schemas.openxmlformats.org/officeDocument/2006/relationships" xmlns:p="http://schemas.openxmlformats.org/presentationml/2006/main">
-  <p:cSld>
-    <p:spTree>
-      <p:nvGrpSpPr>
-        <p:cNvPr id="1" name=""/>
-        <p:cNvGrpSpPr/>
-        <p:nvPr/>
-      </p:nvGrpSpPr>
-      <p:grpSpPr>
-        <a:xfrm>
-          <a:off x="0" y="0"/>
-          <a:ext cx="0" cy="0"/>
-          <a:chOff x="0" y="0"/>
-          <a:chExt cx="0" cy="0"/>
-        </a:xfrm>
-      </p:grpSpPr>
-      <p:sp>
-        <p:nvSpPr>
-          <p:cNvPr id="2" name="Title 1">
-            <a:extLst>
-              <a:ext uri="{FF2B5EF4-FFF2-40B4-BE49-F238E27FC236}">
-                <a16:creationId xmlns:a16="http://schemas.microsoft.com/office/drawing/2014/main" id="{3C3FE5AB-BF23-45A6-BD03-71178AB82233}"/>
-              </a:ext>
-            </a:extLst>
-          </p:cNvPr>
-          <p:cNvSpPr>
-            <a:spLocks noGrp="1"/>
-          </p:cNvSpPr>
-          <p:nvPr>
-            <p:ph type="title"/>
-          </p:nvPr>
-        </p:nvSpPr>
-        <p:spPr/>
-        <p:txBody>
-          <a:bodyPr/>
-          <a:lstStyle/>
-          <a:p>
-            <a:r>
-              <a:rPr lang="en-US" dirty="0"/>
-              <a:t>Example</a:t>
-            </a:r>
-            <a:endParaRPr lang="en-IL" dirty="0"/>
-          </a:p>
-        </p:txBody>
-      </p:sp>
-      <p:sp>
-        <p:nvSpPr>
-          <p:cNvPr id="3" name="Content Placeholder 2">
-            <a:extLst>
-              <a:ext uri="{FF2B5EF4-FFF2-40B4-BE49-F238E27FC236}">
-                <a16:creationId xmlns:a16="http://schemas.microsoft.com/office/drawing/2014/main" id="{609889F5-15AB-403C-8738-EEE0BC822051}"/>
-              </a:ext>
-            </a:extLst>
-          </p:cNvPr>
-          <p:cNvSpPr>
-            <a:spLocks noGrp="1"/>
-          </p:cNvSpPr>
-          <p:nvPr>
-            <p:ph idx="1"/>
-          </p:nvPr>
-        </p:nvSpPr>
-        <p:spPr/>
-        <p:txBody>
-          <a:bodyPr/>
-          <a:lstStyle/>
-          <a:p>
-            <a:r>
-              <a:rPr lang="en-US" dirty="0"/>
-              <a:t>Adopted from </a:t>
-            </a:r>
-            <a:r>
-              <a:rPr lang="en-US" dirty="0">
-                <a:hlinkClick r:id="rId3"/>
-              </a:rPr>
-              <a:t>Advanced R, by Hadley </a:t>
-            </a:r>
-            <a:r>
-              <a:rPr lang="en-US" dirty="0" err="1">
-                <a:hlinkClick r:id="rId3"/>
-              </a:rPr>
-              <a:t>Wickam</a:t>
-            </a:r>
-            <a:endParaRPr lang="en-IL" dirty="0"/>
-          </a:p>
-        </p:txBody>
-      </p:sp>
-      <p:sp>
-        <p:nvSpPr>
-          <p:cNvPr id="4" name="Footer Placeholder 3">
-            <a:extLst>
-              <a:ext uri="{FF2B5EF4-FFF2-40B4-BE49-F238E27FC236}">
-                <a16:creationId xmlns:a16="http://schemas.microsoft.com/office/drawing/2014/main" id="{071CA1A9-E725-4248-8FB7-8316D1C0B093}"/>
-              </a:ext>
-            </a:extLst>
-          </p:cNvPr>
-          <p:cNvSpPr>
-            <a:spLocks noGrp="1"/>
-          </p:cNvSpPr>
-          <p:nvPr>
-            <p:ph type="ftr" sz="quarter" idx="11"/>
-          </p:nvPr>
-        </p:nvSpPr>
-        <p:spPr/>
-        <p:txBody>
-          <a:bodyPr/>
-          <a:lstStyle/>
-          <a:p>
-            <a:r>
-              <a:rPr lang="en-US"/>
-              <a:t>Materials by Adi Sarid https://adisarid.github.io and http://www.sarid-ins.com</a:t>
-            </a:r>
-            <a:endParaRPr lang="en-US" dirty="0"/>
-          </a:p>
-        </p:txBody>
-      </p:sp>
-      <p:sp>
-        <p:nvSpPr>
-          <p:cNvPr id="5" name="Slide Number Placeholder 4">
-            <a:extLst>
-              <a:ext uri="{FF2B5EF4-FFF2-40B4-BE49-F238E27FC236}">
-                <a16:creationId xmlns:a16="http://schemas.microsoft.com/office/drawing/2014/main" id="{0968B632-100C-4C6B-82BD-55A9806C2AA8}"/>
-              </a:ext>
-            </a:extLst>
-          </p:cNvPr>
-          <p:cNvSpPr>
-            <a:spLocks noGrp="1"/>
-          </p:cNvSpPr>
-          <p:nvPr>
-            <p:ph type="sldNum" sz="quarter" idx="12"/>
-          </p:nvPr>
-        </p:nvSpPr>
-        <p:spPr/>
-        <p:txBody>
-          <a:bodyPr/>
-          <a:lstStyle/>
-          <a:p>
-            <a:fld id="{4FAB73BC-B049-4115-A692-8D63A059BFB8}" type="slidenum">
-              <a:rPr lang="en-US" smtClean="0"/>
-              <a:t>3</a:t>
-            </a:fld>
-            <a:endParaRPr lang="en-US" dirty="0"/>
-          </a:p>
-        </p:txBody>
-      </p:sp>
-      <p:sp>
-        <p:nvSpPr>
-          <p:cNvPr id="6" name="TextBox 5">
-            <a:extLst>
-              <a:ext uri="{FF2B5EF4-FFF2-40B4-BE49-F238E27FC236}">
-                <a16:creationId xmlns:a16="http://schemas.microsoft.com/office/drawing/2014/main" id="{0EE908F8-E0CF-46B9-984E-2D735A27F9CB}"/>
-              </a:ext>
-            </a:extLst>
-          </p:cNvPr>
-          <p:cNvSpPr txBox="1"/>
-          <p:nvPr/>
-        </p:nvSpPr>
-        <p:spPr>
-          <a:xfrm>
-            <a:off x="1231271" y="2734147"/>
-            <a:ext cx="9602984" cy="2585323"/>
-          </a:xfrm>
-          <a:prstGeom prst="rect">
-            <a:avLst/>
-          </a:prstGeom>
-          <a:noFill/>
-        </p:spPr>
-        <p:txBody>
-          <a:bodyPr wrap="square" rtlCol="0">
-            <a:spAutoFit/>
-          </a:bodyPr>
-          <a:lstStyle/>
-          <a:p>
-            <a:r>
-              <a:rPr lang="en-US" dirty="0">
-                <a:latin typeface="Courier New" panose="02070309020205020404" pitchFamily="49" charset="0"/>
-                <a:cs typeface="Courier New" panose="02070309020205020404" pitchFamily="49" charset="0"/>
-              </a:rPr>
-              <a:t>paste("good", "morning", "</a:t>
-            </a:r>
-            <a:r>
-              <a:rPr lang="en-US" dirty="0" err="1">
-                <a:latin typeface="Courier New" panose="02070309020205020404" pitchFamily="49" charset="0"/>
-                <a:cs typeface="Courier New" panose="02070309020205020404" pitchFamily="49" charset="0"/>
-              </a:rPr>
-              <a:t>riskified</a:t>
-            </a:r>
-            <a:r>
-              <a:rPr lang="en-US" dirty="0">
-                <a:latin typeface="Courier New" panose="02070309020205020404" pitchFamily="49" charset="0"/>
-                <a:cs typeface="Courier New" panose="02070309020205020404" pitchFamily="49" charset="0"/>
-              </a:rPr>
-              <a:t>!")</a:t>
-            </a:r>
-          </a:p>
-          <a:p>
-            <a:endParaRPr lang="en-US" dirty="0">
-              <a:latin typeface="Courier New" panose="02070309020205020404" pitchFamily="49" charset="0"/>
-              <a:cs typeface="Courier New" panose="02070309020205020404" pitchFamily="49" charset="0"/>
-            </a:endParaRPr>
-          </a:p>
-          <a:p>
-            <a:endParaRPr lang="en-US" dirty="0">
-              <a:latin typeface="Courier New" panose="02070309020205020404" pitchFamily="49" charset="0"/>
-              <a:cs typeface="Courier New" panose="02070309020205020404" pitchFamily="49" charset="0"/>
-            </a:endParaRPr>
-          </a:p>
-          <a:p>
-            <a:r>
-              <a:rPr lang="en-US" dirty="0">
-                <a:latin typeface="Courier New" panose="02070309020205020404" pitchFamily="49" charset="0"/>
-                <a:cs typeface="Courier New" panose="02070309020205020404" pitchFamily="49" charset="0"/>
-              </a:rPr>
-              <a:t>cement &lt;- function(...){</a:t>
-            </a:r>
-          </a:p>
-          <a:p>
-            <a:r>
-              <a:rPr lang="en-US" dirty="0">
-                <a:latin typeface="Courier New" panose="02070309020205020404" pitchFamily="49" charset="0"/>
-                <a:cs typeface="Courier New" panose="02070309020205020404" pitchFamily="49" charset="0"/>
-              </a:rPr>
-              <a:t>   </a:t>
-            </a:r>
-            <a:r>
-              <a:rPr lang="en-US" dirty="0" err="1">
-                <a:latin typeface="Courier New" panose="02070309020205020404" pitchFamily="49" charset="0"/>
-                <a:cs typeface="Courier New" panose="02070309020205020404" pitchFamily="49" charset="0"/>
-              </a:rPr>
-              <a:t>args</a:t>
-            </a:r>
-            <a:r>
-              <a:rPr lang="en-US" dirty="0">
-                <a:latin typeface="Courier New" panose="02070309020205020404" pitchFamily="49" charset="0"/>
-                <a:cs typeface="Courier New" panose="02070309020205020404" pitchFamily="49" charset="0"/>
-              </a:rPr>
-              <a:t> &lt;- </a:t>
-            </a:r>
-            <a:r>
-              <a:rPr lang="en-US" dirty="0" err="1">
-                <a:latin typeface="Courier New" panose="02070309020205020404" pitchFamily="49" charset="0"/>
-                <a:cs typeface="Courier New" panose="02070309020205020404" pitchFamily="49" charset="0"/>
-              </a:rPr>
-              <a:t>ensyms</a:t>
-            </a:r>
-            <a:r>
-              <a:rPr lang="en-US" dirty="0">
-                <a:latin typeface="Courier New" panose="02070309020205020404" pitchFamily="49" charset="0"/>
-                <a:cs typeface="Courier New" panose="02070309020205020404" pitchFamily="49" charset="0"/>
-              </a:rPr>
-              <a:t>(...)</a:t>
-            </a:r>
-          </a:p>
-          <a:p>
-            <a:r>
-              <a:rPr lang="en-US" dirty="0">
-                <a:latin typeface="Courier New" panose="02070309020205020404" pitchFamily="49" charset="0"/>
-                <a:cs typeface="Courier New" panose="02070309020205020404" pitchFamily="49" charset="0"/>
-              </a:rPr>
-              <a:t>   paste(</a:t>
-            </a:r>
-            <a:r>
-              <a:rPr lang="en-US" dirty="0" err="1">
-                <a:latin typeface="Courier New" panose="02070309020205020404" pitchFamily="49" charset="0"/>
-                <a:cs typeface="Courier New" panose="02070309020205020404" pitchFamily="49" charset="0"/>
-              </a:rPr>
-              <a:t>purrr</a:t>
-            </a:r>
-            <a:r>
-              <a:rPr lang="en-US" dirty="0">
-                <a:latin typeface="Courier New" panose="02070309020205020404" pitchFamily="49" charset="0"/>
-                <a:cs typeface="Courier New" panose="02070309020205020404" pitchFamily="49" charset="0"/>
-              </a:rPr>
-              <a:t>::map(</a:t>
-            </a:r>
-            <a:r>
-              <a:rPr lang="en-US" dirty="0" err="1">
-                <a:latin typeface="Courier New" panose="02070309020205020404" pitchFamily="49" charset="0"/>
-                <a:cs typeface="Courier New" panose="02070309020205020404" pitchFamily="49" charset="0"/>
-              </a:rPr>
-              <a:t>args</a:t>
-            </a:r>
-            <a:r>
-              <a:rPr lang="en-US" dirty="0">
-                <a:latin typeface="Courier New" panose="02070309020205020404" pitchFamily="49" charset="0"/>
-                <a:cs typeface="Courier New" panose="02070309020205020404" pitchFamily="49" charset="0"/>
-              </a:rPr>
-              <a:t>, </a:t>
-            </a:r>
-            <a:r>
-              <a:rPr lang="en-US" dirty="0" err="1">
-                <a:latin typeface="Courier New" panose="02070309020205020404" pitchFamily="49" charset="0"/>
-                <a:cs typeface="Courier New" panose="02070309020205020404" pitchFamily="49" charset="0"/>
-              </a:rPr>
-              <a:t>as.character</a:t>
-            </a:r>
-            <a:r>
-              <a:rPr lang="en-US" dirty="0">
-                <a:latin typeface="Courier New" panose="02070309020205020404" pitchFamily="49" charset="0"/>
-                <a:cs typeface="Courier New" panose="02070309020205020404" pitchFamily="49" charset="0"/>
-              </a:rPr>
-              <a:t>), collapse = " ")</a:t>
-            </a:r>
-          </a:p>
-          <a:p>
-            <a:r>
-              <a:rPr lang="en-US" dirty="0">
-                <a:latin typeface="Courier New" panose="02070309020205020404" pitchFamily="49" charset="0"/>
-                <a:cs typeface="Courier New" panose="02070309020205020404" pitchFamily="49" charset="0"/>
-              </a:rPr>
-              <a:t>}</a:t>
-            </a:r>
-          </a:p>
-          <a:p>
-            <a:endParaRPr lang="en-US" dirty="0">
-              <a:latin typeface="Courier New" panose="02070309020205020404" pitchFamily="49" charset="0"/>
-              <a:cs typeface="Courier New" panose="02070309020205020404" pitchFamily="49" charset="0"/>
-            </a:endParaRPr>
-          </a:p>
-          <a:p>
-            <a:r>
-              <a:rPr lang="en-US" dirty="0">
-                <a:latin typeface="Courier New" panose="02070309020205020404" pitchFamily="49" charset="0"/>
-                <a:cs typeface="Courier New" panose="02070309020205020404" pitchFamily="49" charset="0"/>
-              </a:rPr>
-              <a:t>cement(good, morning, </a:t>
-            </a:r>
-            <a:r>
-              <a:rPr lang="en-US" dirty="0" err="1">
-                <a:latin typeface="Courier New" panose="02070309020205020404" pitchFamily="49" charset="0"/>
-                <a:cs typeface="Courier New" panose="02070309020205020404" pitchFamily="49" charset="0"/>
-              </a:rPr>
-              <a:t>riskified</a:t>
-            </a:r>
-            <a:r>
-              <a:rPr lang="en-US" dirty="0">
-                <a:latin typeface="Courier New" panose="02070309020205020404" pitchFamily="49" charset="0"/>
-                <a:cs typeface="Courier New" panose="02070309020205020404" pitchFamily="49" charset="0"/>
-              </a:rPr>
-              <a:t>)</a:t>
-            </a:r>
-          </a:p>
-        </p:txBody>
-      </p:sp>
-    </p:spTree>
-    <p:extLst>
-      <p:ext uri="{BB962C8B-B14F-4D97-AF65-F5344CB8AC3E}">
-        <p14:creationId xmlns:p14="http://schemas.microsoft.com/office/powerpoint/2010/main" val="765826295"/>
-      </p:ext>
-    </p:extLst>
-  </p:cSld>
-  <p:clrMapOvr>
-    <a:masterClrMapping/>
-  </p:clrMapOvr>
-</p:sld>
-</file>
-
 <file path=ppt/slides/slide4.xml><?xml version="1.0" encoding="utf-8"?>
 <p:sld xmlns:a="http://schemas.openxmlformats.org/drawingml/2006/main" xmlns:r="http://schemas.openxmlformats.org/officeDocument/2006/relationships" xmlns:p="http://schemas.openxmlformats.org/presentationml/2006/main">
   <p:cSld>
@@ -5733,6 +5603,363 @@
       </p:grpSpPr>
       <p:sp>
         <p:nvSpPr>
+          <p:cNvPr id="2" name="Title 1">
+            <a:extLst>
+              <a:ext uri="{FF2B5EF4-FFF2-40B4-BE49-F238E27FC236}">
+                <a16:creationId xmlns:a16="http://schemas.microsoft.com/office/drawing/2014/main" id="{3C3FE5AB-BF23-45A6-BD03-71178AB82233}"/>
+              </a:ext>
+            </a:extLst>
+          </p:cNvPr>
+          <p:cNvSpPr>
+            <a:spLocks noGrp="1"/>
+          </p:cNvSpPr>
+          <p:nvPr>
+            <p:ph type="title"/>
+          </p:nvPr>
+        </p:nvSpPr>
+        <p:spPr/>
+        <p:txBody>
+          <a:bodyPr/>
+          <a:lstStyle/>
+          <a:p>
+            <a:r>
+              <a:rPr lang="en-US" dirty="0"/>
+              <a:t>Example</a:t>
+            </a:r>
+            <a:endParaRPr lang="en-IL" dirty="0"/>
+          </a:p>
+        </p:txBody>
+      </p:sp>
+      <p:sp>
+        <p:nvSpPr>
+          <p:cNvPr id="3" name="Content Placeholder 2">
+            <a:extLst>
+              <a:ext uri="{FF2B5EF4-FFF2-40B4-BE49-F238E27FC236}">
+                <a16:creationId xmlns:a16="http://schemas.microsoft.com/office/drawing/2014/main" id="{609889F5-15AB-403C-8738-EEE0BC822051}"/>
+              </a:ext>
+            </a:extLst>
+          </p:cNvPr>
+          <p:cNvSpPr>
+            <a:spLocks noGrp="1"/>
+          </p:cNvSpPr>
+          <p:nvPr>
+            <p:ph idx="1"/>
+          </p:nvPr>
+        </p:nvSpPr>
+        <p:spPr/>
+        <p:txBody>
+          <a:bodyPr/>
+          <a:lstStyle/>
+          <a:p>
+            <a:r>
+              <a:rPr lang="en-US" dirty="0"/>
+              <a:t>Adopted from </a:t>
+            </a:r>
+            <a:r>
+              <a:rPr lang="en-US" dirty="0">
+                <a:hlinkClick r:id="rId3"/>
+              </a:rPr>
+              <a:t>Advanced R, by Hadley </a:t>
+            </a:r>
+            <a:r>
+              <a:rPr lang="en-US" dirty="0" err="1">
+                <a:hlinkClick r:id="rId3"/>
+              </a:rPr>
+              <a:t>Wickam</a:t>
+            </a:r>
+            <a:endParaRPr lang="en-IL" dirty="0"/>
+          </a:p>
+        </p:txBody>
+      </p:sp>
+      <p:sp>
+        <p:nvSpPr>
+          <p:cNvPr id="4" name="Footer Placeholder 3">
+            <a:extLst>
+              <a:ext uri="{FF2B5EF4-FFF2-40B4-BE49-F238E27FC236}">
+                <a16:creationId xmlns:a16="http://schemas.microsoft.com/office/drawing/2014/main" id="{071CA1A9-E725-4248-8FB7-8316D1C0B093}"/>
+              </a:ext>
+            </a:extLst>
+          </p:cNvPr>
+          <p:cNvSpPr>
+            <a:spLocks noGrp="1"/>
+          </p:cNvSpPr>
+          <p:nvPr>
+            <p:ph type="ftr" sz="quarter" idx="11"/>
+          </p:nvPr>
+        </p:nvSpPr>
+        <p:spPr/>
+        <p:txBody>
+          <a:bodyPr/>
+          <a:lstStyle/>
+          <a:p>
+            <a:r>
+              <a:rPr lang="en-US"/>
+              <a:t>Materials by Adi Sarid https://adisarid.github.io and http://www.sarid-ins.com</a:t>
+            </a:r>
+            <a:endParaRPr lang="en-US" dirty="0"/>
+          </a:p>
+        </p:txBody>
+      </p:sp>
+      <p:sp>
+        <p:nvSpPr>
+          <p:cNvPr id="5" name="Slide Number Placeholder 4">
+            <a:extLst>
+              <a:ext uri="{FF2B5EF4-FFF2-40B4-BE49-F238E27FC236}">
+                <a16:creationId xmlns:a16="http://schemas.microsoft.com/office/drawing/2014/main" id="{0968B632-100C-4C6B-82BD-55A9806C2AA8}"/>
+              </a:ext>
+            </a:extLst>
+          </p:cNvPr>
+          <p:cNvSpPr>
+            <a:spLocks noGrp="1"/>
+          </p:cNvSpPr>
+          <p:nvPr>
+            <p:ph type="sldNum" sz="quarter" idx="12"/>
+          </p:nvPr>
+        </p:nvSpPr>
+        <p:spPr/>
+        <p:txBody>
+          <a:bodyPr/>
+          <a:lstStyle/>
+          <a:p>
+            <a:fld id="{4FAB73BC-B049-4115-A692-8D63A059BFB8}" type="slidenum">
+              <a:rPr lang="en-US" smtClean="0"/>
+              <a:t>4</a:t>
+            </a:fld>
+            <a:endParaRPr lang="en-US" dirty="0"/>
+          </a:p>
+        </p:txBody>
+      </p:sp>
+      <p:sp>
+        <p:nvSpPr>
+          <p:cNvPr id="6" name="TextBox 5">
+            <a:extLst>
+              <a:ext uri="{FF2B5EF4-FFF2-40B4-BE49-F238E27FC236}">
+                <a16:creationId xmlns:a16="http://schemas.microsoft.com/office/drawing/2014/main" id="{0EE908F8-E0CF-46B9-984E-2D735A27F9CB}"/>
+              </a:ext>
+            </a:extLst>
+          </p:cNvPr>
+          <p:cNvSpPr txBox="1"/>
+          <p:nvPr/>
+        </p:nvSpPr>
+        <p:spPr>
+          <a:xfrm>
+            <a:off x="1231271" y="2734147"/>
+            <a:ext cx="9602984" cy="2585323"/>
+          </a:xfrm>
+          <a:prstGeom prst="rect">
+            <a:avLst/>
+          </a:prstGeom>
+          <a:noFill/>
+        </p:spPr>
+        <p:txBody>
+          <a:bodyPr wrap="square" rtlCol="0">
+            <a:spAutoFit/>
+          </a:bodyPr>
+          <a:lstStyle/>
+          <a:p>
+            <a:r>
+              <a:rPr lang="en-US" dirty="0">
+                <a:latin typeface="Courier New" panose="02070309020205020404" pitchFamily="49" charset="0"/>
+                <a:cs typeface="Courier New" panose="02070309020205020404" pitchFamily="49" charset="0"/>
+              </a:rPr>
+              <a:t>paste("good", "morning", "</a:t>
+            </a:r>
+            <a:r>
+              <a:rPr lang="en-US" dirty="0" err="1">
+                <a:latin typeface="Courier New" panose="02070309020205020404" pitchFamily="49" charset="0"/>
+                <a:cs typeface="Courier New" panose="02070309020205020404" pitchFamily="49" charset="0"/>
+              </a:rPr>
+              <a:t>riskified</a:t>
+            </a:r>
+            <a:r>
+              <a:rPr lang="en-US" dirty="0">
+                <a:latin typeface="Courier New" panose="02070309020205020404" pitchFamily="49" charset="0"/>
+                <a:cs typeface="Courier New" panose="02070309020205020404" pitchFamily="49" charset="0"/>
+              </a:rPr>
+              <a:t>!")</a:t>
+            </a:r>
+          </a:p>
+          <a:p>
+            <a:endParaRPr lang="en-US" dirty="0">
+              <a:latin typeface="Courier New" panose="02070309020205020404" pitchFamily="49" charset="0"/>
+              <a:cs typeface="Courier New" panose="02070309020205020404" pitchFamily="49" charset="0"/>
+            </a:endParaRPr>
+          </a:p>
+          <a:p>
+            <a:endParaRPr lang="en-US" dirty="0">
+              <a:latin typeface="Courier New" panose="02070309020205020404" pitchFamily="49" charset="0"/>
+              <a:cs typeface="Courier New" panose="02070309020205020404" pitchFamily="49" charset="0"/>
+            </a:endParaRPr>
+          </a:p>
+          <a:p>
+            <a:r>
+              <a:rPr lang="en-US" dirty="0">
+                <a:latin typeface="Courier New" panose="02070309020205020404" pitchFamily="49" charset="0"/>
+                <a:cs typeface="Courier New" panose="02070309020205020404" pitchFamily="49" charset="0"/>
+              </a:rPr>
+              <a:t>cement &lt;- function(...){</a:t>
+            </a:r>
+          </a:p>
+          <a:p>
+            <a:r>
+              <a:rPr lang="en-US" dirty="0">
+                <a:latin typeface="Courier New" panose="02070309020205020404" pitchFamily="49" charset="0"/>
+                <a:cs typeface="Courier New" panose="02070309020205020404" pitchFamily="49" charset="0"/>
+              </a:rPr>
+              <a:t>   </a:t>
+            </a:r>
+            <a:r>
+              <a:rPr lang="en-US" dirty="0" err="1">
+                <a:latin typeface="Courier New" panose="02070309020205020404" pitchFamily="49" charset="0"/>
+                <a:cs typeface="Courier New" panose="02070309020205020404" pitchFamily="49" charset="0"/>
+              </a:rPr>
+              <a:t>args</a:t>
+            </a:r>
+            <a:r>
+              <a:rPr lang="en-US" dirty="0">
+                <a:latin typeface="Courier New" panose="02070309020205020404" pitchFamily="49" charset="0"/>
+                <a:cs typeface="Courier New" panose="02070309020205020404" pitchFamily="49" charset="0"/>
+              </a:rPr>
+              <a:t> &lt;- </a:t>
+            </a:r>
+            <a:r>
+              <a:rPr lang="en-US" dirty="0" err="1">
+                <a:latin typeface="Courier New" panose="02070309020205020404" pitchFamily="49" charset="0"/>
+                <a:cs typeface="Courier New" panose="02070309020205020404" pitchFamily="49" charset="0"/>
+              </a:rPr>
+              <a:t>ensyms</a:t>
+            </a:r>
+            <a:r>
+              <a:rPr lang="en-US" dirty="0">
+                <a:latin typeface="Courier New" panose="02070309020205020404" pitchFamily="49" charset="0"/>
+                <a:cs typeface="Courier New" panose="02070309020205020404" pitchFamily="49" charset="0"/>
+              </a:rPr>
+              <a:t>(...)</a:t>
+            </a:r>
+          </a:p>
+          <a:p>
+            <a:r>
+              <a:rPr lang="en-US" dirty="0">
+                <a:latin typeface="Courier New" panose="02070309020205020404" pitchFamily="49" charset="0"/>
+                <a:cs typeface="Courier New" panose="02070309020205020404" pitchFamily="49" charset="0"/>
+              </a:rPr>
+              <a:t>   paste(</a:t>
+            </a:r>
+            <a:r>
+              <a:rPr lang="en-US" dirty="0" err="1">
+                <a:latin typeface="Courier New" panose="02070309020205020404" pitchFamily="49" charset="0"/>
+                <a:cs typeface="Courier New" panose="02070309020205020404" pitchFamily="49" charset="0"/>
+              </a:rPr>
+              <a:t>purrr</a:t>
+            </a:r>
+            <a:r>
+              <a:rPr lang="en-US" dirty="0">
+                <a:latin typeface="Courier New" panose="02070309020205020404" pitchFamily="49" charset="0"/>
+                <a:cs typeface="Courier New" panose="02070309020205020404" pitchFamily="49" charset="0"/>
+              </a:rPr>
+              <a:t>::map(</a:t>
+            </a:r>
+            <a:r>
+              <a:rPr lang="en-US" dirty="0" err="1">
+                <a:latin typeface="Courier New" panose="02070309020205020404" pitchFamily="49" charset="0"/>
+                <a:cs typeface="Courier New" panose="02070309020205020404" pitchFamily="49" charset="0"/>
+              </a:rPr>
+              <a:t>args</a:t>
+            </a:r>
+            <a:r>
+              <a:rPr lang="en-US" dirty="0">
+                <a:latin typeface="Courier New" panose="02070309020205020404" pitchFamily="49" charset="0"/>
+                <a:cs typeface="Courier New" panose="02070309020205020404" pitchFamily="49" charset="0"/>
+              </a:rPr>
+              <a:t>, </a:t>
+            </a:r>
+            <a:r>
+              <a:rPr lang="en-US" dirty="0" err="1">
+                <a:latin typeface="Courier New" panose="02070309020205020404" pitchFamily="49" charset="0"/>
+                <a:cs typeface="Courier New" panose="02070309020205020404" pitchFamily="49" charset="0"/>
+              </a:rPr>
+              <a:t>as.character</a:t>
+            </a:r>
+            <a:r>
+              <a:rPr lang="en-US" dirty="0">
+                <a:latin typeface="Courier New" panose="02070309020205020404" pitchFamily="49" charset="0"/>
+                <a:cs typeface="Courier New" panose="02070309020205020404" pitchFamily="49" charset="0"/>
+              </a:rPr>
+              <a:t>), collapse = " ")</a:t>
+            </a:r>
+          </a:p>
+          <a:p>
+            <a:r>
+              <a:rPr lang="en-US" dirty="0">
+                <a:latin typeface="Courier New" panose="02070309020205020404" pitchFamily="49" charset="0"/>
+                <a:cs typeface="Courier New" panose="02070309020205020404" pitchFamily="49" charset="0"/>
+              </a:rPr>
+              <a:t>}</a:t>
+            </a:r>
+          </a:p>
+          <a:p>
+            <a:endParaRPr lang="en-US" dirty="0">
+              <a:latin typeface="Courier New" panose="02070309020205020404" pitchFamily="49" charset="0"/>
+              <a:cs typeface="Courier New" panose="02070309020205020404" pitchFamily="49" charset="0"/>
+            </a:endParaRPr>
+          </a:p>
+          <a:p>
+            <a:r>
+              <a:rPr lang="en-US" dirty="0">
+                <a:latin typeface="Courier New" panose="02070309020205020404" pitchFamily="49" charset="0"/>
+                <a:cs typeface="Courier New" panose="02070309020205020404" pitchFamily="49" charset="0"/>
+              </a:rPr>
+              <a:t>cement(good, morning, </a:t>
+            </a:r>
+            <a:r>
+              <a:rPr lang="en-US" dirty="0" err="1">
+                <a:latin typeface="Courier New" panose="02070309020205020404" pitchFamily="49" charset="0"/>
+                <a:cs typeface="Courier New" panose="02070309020205020404" pitchFamily="49" charset="0"/>
+              </a:rPr>
+              <a:t>riskified</a:t>
+            </a:r>
+            <a:r>
+              <a:rPr lang="en-US" dirty="0">
+                <a:latin typeface="Courier New" panose="02070309020205020404" pitchFamily="49" charset="0"/>
+                <a:cs typeface="Courier New" panose="02070309020205020404" pitchFamily="49" charset="0"/>
+              </a:rPr>
+              <a:t>)</a:t>
+            </a:r>
+          </a:p>
+        </p:txBody>
+      </p:sp>
+    </p:spTree>
+    <p:extLst>
+      <p:ext uri="{BB962C8B-B14F-4D97-AF65-F5344CB8AC3E}">
+        <p14:creationId xmlns:p14="http://schemas.microsoft.com/office/powerpoint/2010/main" val="765826295"/>
+      </p:ext>
+    </p:extLst>
+  </p:cSld>
+  <p:clrMapOvr>
+    <a:masterClrMapping/>
+  </p:clrMapOvr>
+</p:sld>
+</file>
+
+<file path=ppt/slides/slide5.xml><?xml version="1.0" encoding="utf-8"?>
+<p:sld xmlns:a="http://schemas.openxmlformats.org/drawingml/2006/main" xmlns:r="http://schemas.openxmlformats.org/officeDocument/2006/relationships" xmlns:p="http://schemas.openxmlformats.org/presentationml/2006/main">
+  <p:cSld>
+    <p:spTree>
+      <p:nvGrpSpPr>
+        <p:cNvPr id="1" name=""/>
+        <p:cNvGrpSpPr/>
+        <p:nvPr/>
+      </p:nvGrpSpPr>
+      <p:grpSpPr>
+        <a:xfrm>
+          <a:off x="0" y="0"/>
+          <a:ext cx="0" cy="0"/>
+          <a:chOff x="0" y="0"/>
+          <a:chExt cx="0" cy="0"/>
+        </a:xfrm>
+      </p:grpSpPr>
+      <p:sp>
+        <p:nvSpPr>
           <p:cNvPr id="15" name="TextBox 14">
             <a:extLst>
               <a:ext uri="{FF2B5EF4-FFF2-40B4-BE49-F238E27FC236}">
@@ -5857,7 +6084,7 @@
           <a:p>
             <a:fld id="{4FAB73BC-B049-4115-A692-8D63A059BFB8}" type="slidenum">
               <a:rPr lang="en-US" smtClean="0"/>
-              <a:t>4</a:t>
+              <a:t>5</a:t>
             </a:fld>
             <a:endParaRPr lang="en-US" dirty="0"/>
           </a:p>
@@ -7313,7 +7540,7 @@
 </p:sld>
 </file>
 
-<file path=ppt/slides/slide5.xml><?xml version="1.0" encoding="utf-8"?>
+<file path=ppt/slides/slide6.xml><?xml version="1.0" encoding="utf-8"?>
 <p:sld xmlns:a="http://schemas.openxmlformats.org/drawingml/2006/main" xmlns:r="http://schemas.openxmlformats.org/officeDocument/2006/relationships" xmlns:p="http://schemas.openxmlformats.org/presentationml/2006/main">
   <p:cSld>
     <p:spTree>
@@ -7413,7 +7640,7 @@
           <a:p>
             <a:fld id="{4FAB73BC-B049-4115-A692-8D63A059BFB8}" type="slidenum">
               <a:rPr lang="en-US" smtClean="0"/>
-              <a:t>5</a:t>
+              <a:t>6</a:t>
             </a:fld>
             <a:endParaRPr lang="en-US" dirty="0"/>
           </a:p>
@@ -8374,436 +8601,6 @@
     <p:extLst>
       <p:ext uri="{BB962C8B-B14F-4D97-AF65-F5344CB8AC3E}">
         <p14:creationId xmlns:p14="http://schemas.microsoft.com/office/powerpoint/2010/main" val="1816801969"/>
-      </p:ext>
-    </p:extLst>
-  </p:cSld>
-  <p:clrMapOvr>
-    <a:masterClrMapping/>
-  </p:clrMapOvr>
-</p:sld>
-</file>
-
-<file path=ppt/slides/slide6.xml><?xml version="1.0" encoding="utf-8"?>
-<p:sld xmlns:a="http://schemas.openxmlformats.org/drawingml/2006/main" xmlns:r="http://schemas.openxmlformats.org/officeDocument/2006/relationships" xmlns:p="http://schemas.openxmlformats.org/presentationml/2006/main">
-  <p:cSld>
-    <p:spTree>
-      <p:nvGrpSpPr>
-        <p:cNvPr id="1" name=""/>
-        <p:cNvGrpSpPr/>
-        <p:nvPr/>
-      </p:nvGrpSpPr>
-      <p:grpSpPr>
-        <a:xfrm>
-          <a:off x="0" y="0"/>
-          <a:ext cx="0" cy="0"/>
-          <a:chOff x="0" y="0"/>
-          <a:chExt cx="0" cy="0"/>
-        </a:xfrm>
-      </p:grpSpPr>
-      <p:sp>
-        <p:nvSpPr>
-          <p:cNvPr id="2" name="Title 1">
-            <a:extLst>
-              <a:ext uri="{FF2B5EF4-FFF2-40B4-BE49-F238E27FC236}">
-                <a16:creationId xmlns:a16="http://schemas.microsoft.com/office/drawing/2014/main" id="{7A0F7A03-9C4A-4E09-9735-231FA21E28F8}"/>
-              </a:ext>
-            </a:extLst>
-          </p:cNvPr>
-          <p:cNvSpPr>
-            <a:spLocks noGrp="1"/>
-          </p:cNvSpPr>
-          <p:nvPr>
-            <p:ph type="title"/>
-          </p:nvPr>
-        </p:nvSpPr>
-        <p:spPr/>
-        <p:txBody>
-          <a:bodyPr>
-            <a:normAutofit/>
-          </a:bodyPr>
-          <a:lstStyle/>
-          <a:p>
-            <a:r>
-              <a:rPr lang="en-US" sz="4000" dirty="0"/>
-              <a:t>How to implement quotation and evaluation in a tidy manner?</a:t>
-            </a:r>
-            <a:endParaRPr lang="en-IL" sz="4000" dirty="0"/>
-          </a:p>
-        </p:txBody>
-      </p:sp>
-      <p:sp>
-        <p:nvSpPr>
-          <p:cNvPr id="3" name="Content Placeholder 2">
-            <a:extLst>
-              <a:ext uri="{FF2B5EF4-FFF2-40B4-BE49-F238E27FC236}">
-                <a16:creationId xmlns:a16="http://schemas.microsoft.com/office/drawing/2014/main" id="{F17BC820-1D86-4378-B7D3-B77EAD73299F}"/>
-              </a:ext>
-            </a:extLst>
-          </p:cNvPr>
-          <p:cNvSpPr>
-            <a:spLocks noGrp="1"/>
-          </p:cNvSpPr>
-          <p:nvPr>
-            <p:ph idx="1"/>
-          </p:nvPr>
-        </p:nvSpPr>
-        <p:spPr>
-          <a:xfrm>
-            <a:off x="1069848" y="2063351"/>
-            <a:ext cx="10058400" cy="1899049"/>
-          </a:xfrm>
-        </p:spPr>
-        <p:txBody>
-          <a:bodyPr>
-            <a:normAutofit/>
-          </a:bodyPr>
-          <a:lstStyle/>
-          <a:p>
-            <a:r>
-              <a:rPr lang="en-US" dirty="0"/>
-              <a:t>Use </a:t>
-            </a:r>
-            <a:r>
-              <a:rPr lang="en-US" i="1" dirty="0" err="1"/>
-              <a:t>enquo</a:t>
-            </a:r>
-            <a:r>
-              <a:rPr lang="en-US" i="1" dirty="0"/>
-              <a:t>()</a:t>
-            </a:r>
-            <a:r>
-              <a:rPr lang="en-US" dirty="0"/>
-              <a:t> to tell the function that the argument should be quoted and not evaluated</a:t>
-            </a:r>
-          </a:p>
-          <a:p>
-            <a:r>
-              <a:rPr lang="en-US" dirty="0"/>
-              <a:t>Use </a:t>
-            </a:r>
-            <a:r>
-              <a:rPr lang="en-US" i="1" dirty="0"/>
-              <a:t>!!</a:t>
-            </a:r>
-            <a:r>
-              <a:rPr lang="en-US" dirty="0"/>
-              <a:t> (bang-bang, or unquote) to use the argument in context</a:t>
-            </a:r>
-          </a:p>
-          <a:p>
-            <a:r>
-              <a:rPr lang="en-US" dirty="0"/>
-              <a:t>Multiple arguments can be simply transferred via ... </a:t>
-            </a:r>
-          </a:p>
-          <a:p>
-            <a:pPr lvl="1"/>
-            <a:r>
-              <a:rPr lang="en-US" dirty="0"/>
-              <a:t>If needed, they can be unquoted using </a:t>
-            </a:r>
-            <a:r>
-              <a:rPr lang="en-US" i="1" dirty="0" err="1"/>
-              <a:t>enquos</a:t>
-            </a:r>
-            <a:r>
-              <a:rPr lang="en-US" i="1" dirty="0"/>
-              <a:t>()</a:t>
-            </a:r>
-            <a:r>
-              <a:rPr lang="en-US" dirty="0"/>
-              <a:t> and </a:t>
-            </a:r>
-            <a:r>
-              <a:rPr lang="en-US" i="1" dirty="0"/>
-              <a:t>!!!</a:t>
-            </a:r>
-          </a:p>
-        </p:txBody>
-      </p:sp>
-      <p:sp>
-        <p:nvSpPr>
-          <p:cNvPr id="4" name="Footer Placeholder 3">
-            <a:extLst>
-              <a:ext uri="{FF2B5EF4-FFF2-40B4-BE49-F238E27FC236}">
-                <a16:creationId xmlns:a16="http://schemas.microsoft.com/office/drawing/2014/main" id="{96EFC467-EB07-4E92-9EA4-7A0A93C61BEF}"/>
-              </a:ext>
-            </a:extLst>
-          </p:cNvPr>
-          <p:cNvSpPr>
-            <a:spLocks noGrp="1"/>
-          </p:cNvSpPr>
-          <p:nvPr>
-            <p:ph type="ftr" sz="quarter" idx="11"/>
-          </p:nvPr>
-        </p:nvSpPr>
-        <p:spPr/>
-        <p:txBody>
-          <a:bodyPr/>
-          <a:lstStyle/>
-          <a:p>
-            <a:r>
-              <a:rPr lang="en-US"/>
-              <a:t>Materials by Adi Sarid https://adisarid.github.io and http://www.sarid-ins.com</a:t>
-            </a:r>
-            <a:endParaRPr lang="en-US" dirty="0"/>
-          </a:p>
-        </p:txBody>
-      </p:sp>
-      <p:sp>
-        <p:nvSpPr>
-          <p:cNvPr id="5" name="Slide Number Placeholder 4">
-            <a:extLst>
-              <a:ext uri="{FF2B5EF4-FFF2-40B4-BE49-F238E27FC236}">
-                <a16:creationId xmlns:a16="http://schemas.microsoft.com/office/drawing/2014/main" id="{8335EC3A-EA79-4E31-AC83-039DD27D9BAF}"/>
-              </a:ext>
-            </a:extLst>
-          </p:cNvPr>
-          <p:cNvSpPr>
-            <a:spLocks noGrp="1"/>
-          </p:cNvSpPr>
-          <p:nvPr>
-            <p:ph type="sldNum" sz="quarter" idx="12"/>
-          </p:nvPr>
-        </p:nvSpPr>
-        <p:spPr/>
-        <p:txBody>
-          <a:bodyPr/>
-          <a:lstStyle/>
-          <a:p>
-            <a:fld id="{4FAB73BC-B049-4115-A692-8D63A059BFB8}" type="slidenum">
-              <a:rPr lang="en-US" smtClean="0"/>
-              <a:t>6</a:t>
-            </a:fld>
-            <a:endParaRPr lang="en-US" dirty="0"/>
-          </a:p>
-        </p:txBody>
-      </p:sp>
-      <p:sp>
-        <p:nvSpPr>
-          <p:cNvPr id="6" name="TextBox 5">
-            <a:extLst>
-              <a:ext uri="{FF2B5EF4-FFF2-40B4-BE49-F238E27FC236}">
-                <a16:creationId xmlns:a16="http://schemas.microsoft.com/office/drawing/2014/main" id="{C3E8E55E-4CFF-4AE1-9136-C72902C86747}"/>
-              </a:ext>
-            </a:extLst>
-          </p:cNvPr>
-          <p:cNvSpPr txBox="1"/>
-          <p:nvPr/>
-        </p:nvSpPr>
-        <p:spPr>
-          <a:xfrm>
-            <a:off x="1264603" y="4034400"/>
-            <a:ext cx="5368777" cy="2092881"/>
-          </a:xfrm>
-          <a:prstGeom prst="rect">
-            <a:avLst/>
-          </a:prstGeom>
-          <a:noFill/>
-        </p:spPr>
-        <p:txBody>
-          <a:bodyPr wrap="none" rtlCol="0">
-            <a:spAutoFit/>
-          </a:bodyPr>
-          <a:lstStyle/>
-          <a:p>
-            <a:r>
-              <a:rPr lang="en-US" sz="1600" dirty="0">
-                <a:latin typeface="Courier New" panose="02070309020205020404" pitchFamily="49" charset="0"/>
-                <a:cs typeface="Courier New" panose="02070309020205020404" pitchFamily="49" charset="0"/>
-              </a:rPr>
-              <a:t>prop &lt;- function(data, </a:t>
-            </a:r>
-            <a:r>
-              <a:rPr lang="en-US" sz="1600" dirty="0" err="1">
-                <a:latin typeface="Courier New" panose="02070309020205020404" pitchFamily="49" charset="0"/>
-                <a:cs typeface="Courier New" panose="02070309020205020404" pitchFamily="49" charset="0"/>
-              </a:rPr>
-              <a:t>group_by_var</a:t>
-            </a:r>
-            <a:r>
-              <a:rPr lang="en-US" sz="1600" dirty="0">
-                <a:latin typeface="Courier New" panose="02070309020205020404" pitchFamily="49" charset="0"/>
-                <a:cs typeface="Courier New" panose="02070309020205020404" pitchFamily="49" charset="0"/>
-              </a:rPr>
-              <a:t>, ...){</a:t>
-            </a:r>
-          </a:p>
-          <a:p>
-            <a:r>
-              <a:rPr lang="en-US" sz="1600" dirty="0">
-                <a:latin typeface="Courier New" panose="02070309020205020404" pitchFamily="49" charset="0"/>
-                <a:cs typeface="Courier New" panose="02070309020205020404" pitchFamily="49" charset="0"/>
-              </a:rPr>
-              <a:t>   </a:t>
-            </a:r>
-            <a:r>
-              <a:rPr lang="en-US" sz="1600" dirty="0" err="1">
-                <a:latin typeface="Courier New" panose="02070309020205020404" pitchFamily="49" charset="0"/>
-                <a:cs typeface="Courier New" panose="02070309020205020404" pitchFamily="49" charset="0"/>
-              </a:rPr>
-              <a:t>grouping_var</a:t>
-            </a:r>
-            <a:r>
-              <a:rPr lang="en-US" sz="1600" dirty="0">
-                <a:latin typeface="Courier New" panose="02070309020205020404" pitchFamily="49" charset="0"/>
-                <a:cs typeface="Courier New" panose="02070309020205020404" pitchFamily="49" charset="0"/>
-              </a:rPr>
-              <a:t> &lt;- </a:t>
-            </a:r>
-            <a:r>
-              <a:rPr lang="en-US" sz="1600" dirty="0" err="1">
-                <a:latin typeface="Courier New" panose="02070309020205020404" pitchFamily="49" charset="0"/>
-                <a:cs typeface="Courier New" panose="02070309020205020404" pitchFamily="49" charset="0"/>
-              </a:rPr>
-              <a:t>enquo</a:t>
-            </a:r>
-            <a:r>
-              <a:rPr lang="en-US" sz="1600" dirty="0">
-                <a:latin typeface="Courier New" panose="02070309020205020404" pitchFamily="49" charset="0"/>
-                <a:cs typeface="Courier New" panose="02070309020205020404" pitchFamily="49" charset="0"/>
-              </a:rPr>
-              <a:t>(</a:t>
-            </a:r>
-            <a:r>
-              <a:rPr lang="en-US" sz="1600" dirty="0" err="1">
-                <a:latin typeface="Courier New" panose="02070309020205020404" pitchFamily="49" charset="0"/>
-                <a:cs typeface="Courier New" panose="02070309020205020404" pitchFamily="49" charset="0"/>
-              </a:rPr>
-              <a:t>group_by_var</a:t>
-            </a:r>
-            <a:r>
-              <a:rPr lang="en-US" sz="1600" dirty="0">
-                <a:latin typeface="Courier New" panose="02070309020205020404" pitchFamily="49" charset="0"/>
-                <a:cs typeface="Courier New" panose="02070309020205020404" pitchFamily="49" charset="0"/>
-              </a:rPr>
-              <a:t>)</a:t>
-            </a:r>
-          </a:p>
-          <a:p>
-            <a:r>
-              <a:rPr lang="en-US" sz="1600" dirty="0">
-                <a:latin typeface="Courier New" panose="02070309020205020404" pitchFamily="49" charset="0"/>
-                <a:cs typeface="Courier New" panose="02070309020205020404" pitchFamily="49" charset="0"/>
-              </a:rPr>
-              <a:t>   data %&gt;% </a:t>
-            </a:r>
-          </a:p>
-          <a:p>
-            <a:r>
-              <a:rPr lang="en-US" sz="1600" dirty="0">
-                <a:latin typeface="Courier New" panose="02070309020205020404" pitchFamily="49" charset="0"/>
-                <a:cs typeface="Courier New" panose="02070309020205020404" pitchFamily="49" charset="0"/>
-              </a:rPr>
-              <a:t>      count(!!</a:t>
-            </a:r>
-            <a:r>
-              <a:rPr lang="en-US" sz="1600" dirty="0" err="1">
-                <a:latin typeface="Courier New" panose="02070309020205020404" pitchFamily="49" charset="0"/>
-                <a:cs typeface="Courier New" panose="02070309020205020404" pitchFamily="49" charset="0"/>
-              </a:rPr>
-              <a:t>grouping_var</a:t>
-            </a:r>
-            <a:r>
-              <a:rPr lang="en-US" sz="1600" dirty="0">
-                <a:latin typeface="Courier New" panose="02070309020205020404" pitchFamily="49" charset="0"/>
-                <a:cs typeface="Courier New" panose="02070309020205020404" pitchFamily="49" charset="0"/>
-              </a:rPr>
-              <a:t>, …) %&gt;%</a:t>
-            </a:r>
-          </a:p>
-          <a:p>
-            <a:r>
-              <a:rPr lang="en-US" sz="1600" dirty="0">
-                <a:latin typeface="Courier New" panose="02070309020205020404" pitchFamily="49" charset="0"/>
-                <a:cs typeface="Courier New" panose="02070309020205020404" pitchFamily="49" charset="0"/>
-              </a:rPr>
-              <a:t>      </a:t>
-            </a:r>
-            <a:r>
-              <a:rPr lang="en-US" sz="1600" dirty="0" err="1">
-                <a:latin typeface="Courier New" panose="02070309020205020404" pitchFamily="49" charset="0"/>
-                <a:cs typeface="Courier New" panose="02070309020205020404" pitchFamily="49" charset="0"/>
-              </a:rPr>
-              <a:t>group_by</a:t>
-            </a:r>
-            <a:r>
-              <a:rPr lang="en-US" sz="1600" dirty="0">
-                <a:latin typeface="Courier New" panose="02070309020205020404" pitchFamily="49" charset="0"/>
-                <a:cs typeface="Courier New" panose="02070309020205020404" pitchFamily="49" charset="0"/>
-              </a:rPr>
-              <a:t>(!!</a:t>
-            </a:r>
-            <a:r>
-              <a:rPr lang="en-US" sz="1600" dirty="0" err="1">
-                <a:latin typeface="Courier New" panose="02070309020205020404" pitchFamily="49" charset="0"/>
-                <a:cs typeface="Courier New" panose="02070309020205020404" pitchFamily="49" charset="0"/>
-              </a:rPr>
-              <a:t>grouping_var</a:t>
-            </a:r>
-            <a:r>
-              <a:rPr lang="en-US" sz="1600" dirty="0">
-                <a:latin typeface="Courier New" panose="02070309020205020404" pitchFamily="49" charset="0"/>
-                <a:cs typeface="Courier New" panose="02070309020205020404" pitchFamily="49" charset="0"/>
-              </a:rPr>
-              <a:t>) %&gt;%</a:t>
-            </a:r>
-            <a:br>
-              <a:rPr lang="en-US" sz="1600" dirty="0">
-                <a:latin typeface="Courier New" panose="02070309020205020404" pitchFamily="49" charset="0"/>
-                <a:cs typeface="Courier New" panose="02070309020205020404" pitchFamily="49" charset="0"/>
-              </a:rPr>
-            </a:br>
-            <a:r>
-              <a:rPr lang="en-US" sz="1600" dirty="0">
-                <a:latin typeface="Courier New" panose="02070309020205020404" pitchFamily="49" charset="0"/>
-                <a:cs typeface="Courier New" panose="02070309020205020404" pitchFamily="49" charset="0"/>
-              </a:rPr>
-              <a:t>      mutate(</a:t>
-            </a:r>
-            <a:r>
-              <a:rPr lang="en-US" sz="1600" dirty="0" err="1">
-                <a:latin typeface="Courier New" panose="02070309020205020404" pitchFamily="49" charset="0"/>
-                <a:cs typeface="Courier New" panose="02070309020205020404" pitchFamily="49" charset="0"/>
-              </a:rPr>
-              <a:t>prop_col</a:t>
-            </a:r>
-            <a:r>
-              <a:rPr lang="en-US" sz="1600" dirty="0">
-                <a:latin typeface="Courier New" panose="02070309020205020404" pitchFamily="49" charset="0"/>
-                <a:cs typeface="Courier New" panose="02070309020205020404" pitchFamily="49" charset="0"/>
-              </a:rPr>
-              <a:t> = n/sum(n)) %&gt;%</a:t>
-            </a:r>
-          </a:p>
-          <a:p>
-            <a:r>
-              <a:rPr lang="en-US" sz="1600" dirty="0">
-                <a:latin typeface="Courier New" panose="02070309020205020404" pitchFamily="49" charset="0"/>
-                <a:cs typeface="Courier New" panose="02070309020205020404" pitchFamily="49" charset="0"/>
-              </a:rPr>
-              <a:t>      select(-n)</a:t>
-            </a:r>
-          </a:p>
-          <a:p>
-            <a:r>
-              <a:rPr lang="en-US" sz="1600" dirty="0">
-                <a:latin typeface="Courier New" panose="02070309020205020404" pitchFamily="49" charset="0"/>
-                <a:cs typeface="Courier New" panose="02070309020205020404" pitchFamily="49" charset="0"/>
-              </a:rPr>
-              <a:t>}</a:t>
-            </a:r>
-            <a:endParaRPr lang="en-IL" sz="1600" dirty="0">
-              <a:latin typeface="Courier New" panose="02070309020205020404" pitchFamily="49" charset="0"/>
-              <a:cs typeface="Courier New" panose="02070309020205020404" pitchFamily="49" charset="0"/>
-            </a:endParaRPr>
-          </a:p>
-        </p:txBody>
-      </p:sp>
-    </p:spTree>
-    <p:extLst>
-      <p:ext uri="{BB962C8B-B14F-4D97-AF65-F5344CB8AC3E}">
-        <p14:creationId xmlns:p14="http://schemas.microsoft.com/office/powerpoint/2010/main" val="3977583519"/>
       </p:ext>
     </p:extLst>
   </p:cSld>
@@ -8835,6 +8632,436 @@
           <p:cNvPr id="2" name="Title 1">
             <a:extLst>
               <a:ext uri="{FF2B5EF4-FFF2-40B4-BE49-F238E27FC236}">
+                <a16:creationId xmlns:a16="http://schemas.microsoft.com/office/drawing/2014/main" id="{7A0F7A03-9C4A-4E09-9735-231FA21E28F8}"/>
+              </a:ext>
+            </a:extLst>
+          </p:cNvPr>
+          <p:cNvSpPr>
+            <a:spLocks noGrp="1"/>
+          </p:cNvSpPr>
+          <p:nvPr>
+            <p:ph type="title"/>
+          </p:nvPr>
+        </p:nvSpPr>
+        <p:spPr/>
+        <p:txBody>
+          <a:bodyPr>
+            <a:normAutofit/>
+          </a:bodyPr>
+          <a:lstStyle/>
+          <a:p>
+            <a:r>
+              <a:rPr lang="en-US" sz="4000" dirty="0"/>
+              <a:t>How to implement quotation and evaluation in a tidy manner?</a:t>
+            </a:r>
+            <a:endParaRPr lang="en-IL" sz="4000" dirty="0"/>
+          </a:p>
+        </p:txBody>
+      </p:sp>
+      <p:sp>
+        <p:nvSpPr>
+          <p:cNvPr id="3" name="Content Placeholder 2">
+            <a:extLst>
+              <a:ext uri="{FF2B5EF4-FFF2-40B4-BE49-F238E27FC236}">
+                <a16:creationId xmlns:a16="http://schemas.microsoft.com/office/drawing/2014/main" id="{F17BC820-1D86-4378-B7D3-B77EAD73299F}"/>
+              </a:ext>
+            </a:extLst>
+          </p:cNvPr>
+          <p:cNvSpPr>
+            <a:spLocks noGrp="1"/>
+          </p:cNvSpPr>
+          <p:nvPr>
+            <p:ph idx="1"/>
+          </p:nvPr>
+        </p:nvSpPr>
+        <p:spPr>
+          <a:xfrm>
+            <a:off x="1069848" y="2063351"/>
+            <a:ext cx="10058400" cy="1899049"/>
+          </a:xfrm>
+        </p:spPr>
+        <p:txBody>
+          <a:bodyPr>
+            <a:normAutofit/>
+          </a:bodyPr>
+          <a:lstStyle/>
+          <a:p>
+            <a:r>
+              <a:rPr lang="en-US" dirty="0"/>
+              <a:t>Use </a:t>
+            </a:r>
+            <a:r>
+              <a:rPr lang="en-US" i="1" dirty="0" err="1"/>
+              <a:t>enquo</a:t>
+            </a:r>
+            <a:r>
+              <a:rPr lang="en-US" i="1" dirty="0"/>
+              <a:t>()</a:t>
+            </a:r>
+            <a:r>
+              <a:rPr lang="en-US" dirty="0"/>
+              <a:t> to tell the function that the argument should be quoted and not evaluated</a:t>
+            </a:r>
+          </a:p>
+          <a:p>
+            <a:r>
+              <a:rPr lang="en-US" dirty="0"/>
+              <a:t>Use </a:t>
+            </a:r>
+            <a:r>
+              <a:rPr lang="en-US" i="1" dirty="0"/>
+              <a:t>!!</a:t>
+            </a:r>
+            <a:r>
+              <a:rPr lang="en-US" dirty="0"/>
+              <a:t> (bang-bang, or unquote) to use the argument in context</a:t>
+            </a:r>
+          </a:p>
+          <a:p>
+            <a:r>
+              <a:rPr lang="en-US" dirty="0"/>
+              <a:t>Multiple arguments can be simply transferred via ... </a:t>
+            </a:r>
+          </a:p>
+          <a:p>
+            <a:pPr lvl="1"/>
+            <a:r>
+              <a:rPr lang="en-US" dirty="0"/>
+              <a:t>If needed, they can be unquoted using </a:t>
+            </a:r>
+            <a:r>
+              <a:rPr lang="en-US" i="1" dirty="0" err="1"/>
+              <a:t>enquos</a:t>
+            </a:r>
+            <a:r>
+              <a:rPr lang="en-US" i="1" dirty="0"/>
+              <a:t>()</a:t>
+            </a:r>
+            <a:r>
+              <a:rPr lang="en-US" dirty="0"/>
+              <a:t> and </a:t>
+            </a:r>
+            <a:r>
+              <a:rPr lang="en-US" i="1" dirty="0"/>
+              <a:t>!!!</a:t>
+            </a:r>
+          </a:p>
+        </p:txBody>
+      </p:sp>
+      <p:sp>
+        <p:nvSpPr>
+          <p:cNvPr id="4" name="Footer Placeholder 3">
+            <a:extLst>
+              <a:ext uri="{FF2B5EF4-FFF2-40B4-BE49-F238E27FC236}">
+                <a16:creationId xmlns:a16="http://schemas.microsoft.com/office/drawing/2014/main" id="{96EFC467-EB07-4E92-9EA4-7A0A93C61BEF}"/>
+              </a:ext>
+            </a:extLst>
+          </p:cNvPr>
+          <p:cNvSpPr>
+            <a:spLocks noGrp="1"/>
+          </p:cNvSpPr>
+          <p:nvPr>
+            <p:ph type="ftr" sz="quarter" idx="11"/>
+          </p:nvPr>
+        </p:nvSpPr>
+        <p:spPr/>
+        <p:txBody>
+          <a:bodyPr/>
+          <a:lstStyle/>
+          <a:p>
+            <a:r>
+              <a:rPr lang="en-US"/>
+              <a:t>Materials by Adi Sarid https://adisarid.github.io and http://www.sarid-ins.com</a:t>
+            </a:r>
+            <a:endParaRPr lang="en-US" dirty="0"/>
+          </a:p>
+        </p:txBody>
+      </p:sp>
+      <p:sp>
+        <p:nvSpPr>
+          <p:cNvPr id="5" name="Slide Number Placeholder 4">
+            <a:extLst>
+              <a:ext uri="{FF2B5EF4-FFF2-40B4-BE49-F238E27FC236}">
+                <a16:creationId xmlns:a16="http://schemas.microsoft.com/office/drawing/2014/main" id="{8335EC3A-EA79-4E31-AC83-039DD27D9BAF}"/>
+              </a:ext>
+            </a:extLst>
+          </p:cNvPr>
+          <p:cNvSpPr>
+            <a:spLocks noGrp="1"/>
+          </p:cNvSpPr>
+          <p:nvPr>
+            <p:ph type="sldNum" sz="quarter" idx="12"/>
+          </p:nvPr>
+        </p:nvSpPr>
+        <p:spPr/>
+        <p:txBody>
+          <a:bodyPr/>
+          <a:lstStyle/>
+          <a:p>
+            <a:fld id="{4FAB73BC-B049-4115-A692-8D63A059BFB8}" type="slidenum">
+              <a:rPr lang="en-US" smtClean="0"/>
+              <a:t>7</a:t>
+            </a:fld>
+            <a:endParaRPr lang="en-US" dirty="0"/>
+          </a:p>
+        </p:txBody>
+      </p:sp>
+      <p:sp>
+        <p:nvSpPr>
+          <p:cNvPr id="6" name="TextBox 5">
+            <a:extLst>
+              <a:ext uri="{FF2B5EF4-FFF2-40B4-BE49-F238E27FC236}">
+                <a16:creationId xmlns:a16="http://schemas.microsoft.com/office/drawing/2014/main" id="{C3E8E55E-4CFF-4AE1-9136-C72902C86747}"/>
+              </a:ext>
+            </a:extLst>
+          </p:cNvPr>
+          <p:cNvSpPr txBox="1"/>
+          <p:nvPr/>
+        </p:nvSpPr>
+        <p:spPr>
+          <a:xfrm>
+            <a:off x="1264603" y="4034400"/>
+            <a:ext cx="5368777" cy="2092881"/>
+          </a:xfrm>
+          <a:prstGeom prst="rect">
+            <a:avLst/>
+          </a:prstGeom>
+          <a:noFill/>
+        </p:spPr>
+        <p:txBody>
+          <a:bodyPr wrap="none" rtlCol="0">
+            <a:spAutoFit/>
+          </a:bodyPr>
+          <a:lstStyle/>
+          <a:p>
+            <a:r>
+              <a:rPr lang="en-US" sz="1600" dirty="0">
+                <a:latin typeface="Courier New" panose="02070309020205020404" pitchFamily="49" charset="0"/>
+                <a:cs typeface="Courier New" panose="02070309020205020404" pitchFamily="49" charset="0"/>
+              </a:rPr>
+              <a:t>prop &lt;- function(data, </a:t>
+            </a:r>
+            <a:r>
+              <a:rPr lang="en-US" sz="1600" dirty="0" err="1">
+                <a:latin typeface="Courier New" panose="02070309020205020404" pitchFamily="49" charset="0"/>
+                <a:cs typeface="Courier New" panose="02070309020205020404" pitchFamily="49" charset="0"/>
+              </a:rPr>
+              <a:t>group_by_var</a:t>
+            </a:r>
+            <a:r>
+              <a:rPr lang="en-US" sz="1600" dirty="0">
+                <a:latin typeface="Courier New" panose="02070309020205020404" pitchFamily="49" charset="0"/>
+                <a:cs typeface="Courier New" panose="02070309020205020404" pitchFamily="49" charset="0"/>
+              </a:rPr>
+              <a:t>, ...){</a:t>
+            </a:r>
+          </a:p>
+          <a:p>
+            <a:r>
+              <a:rPr lang="en-US" sz="1600" dirty="0">
+                <a:latin typeface="Courier New" panose="02070309020205020404" pitchFamily="49" charset="0"/>
+                <a:cs typeface="Courier New" panose="02070309020205020404" pitchFamily="49" charset="0"/>
+              </a:rPr>
+              <a:t>   </a:t>
+            </a:r>
+            <a:r>
+              <a:rPr lang="en-US" sz="1600" dirty="0" err="1">
+                <a:latin typeface="Courier New" panose="02070309020205020404" pitchFamily="49" charset="0"/>
+                <a:cs typeface="Courier New" panose="02070309020205020404" pitchFamily="49" charset="0"/>
+              </a:rPr>
+              <a:t>grouping_var</a:t>
+            </a:r>
+            <a:r>
+              <a:rPr lang="en-US" sz="1600" dirty="0">
+                <a:latin typeface="Courier New" panose="02070309020205020404" pitchFamily="49" charset="0"/>
+                <a:cs typeface="Courier New" panose="02070309020205020404" pitchFamily="49" charset="0"/>
+              </a:rPr>
+              <a:t> &lt;- </a:t>
+            </a:r>
+            <a:r>
+              <a:rPr lang="en-US" sz="1600" dirty="0" err="1">
+                <a:latin typeface="Courier New" panose="02070309020205020404" pitchFamily="49" charset="0"/>
+                <a:cs typeface="Courier New" panose="02070309020205020404" pitchFamily="49" charset="0"/>
+              </a:rPr>
+              <a:t>enquo</a:t>
+            </a:r>
+            <a:r>
+              <a:rPr lang="en-US" sz="1600" dirty="0">
+                <a:latin typeface="Courier New" panose="02070309020205020404" pitchFamily="49" charset="0"/>
+                <a:cs typeface="Courier New" panose="02070309020205020404" pitchFamily="49" charset="0"/>
+              </a:rPr>
+              <a:t>(</a:t>
+            </a:r>
+            <a:r>
+              <a:rPr lang="en-US" sz="1600" dirty="0" err="1">
+                <a:latin typeface="Courier New" panose="02070309020205020404" pitchFamily="49" charset="0"/>
+                <a:cs typeface="Courier New" panose="02070309020205020404" pitchFamily="49" charset="0"/>
+              </a:rPr>
+              <a:t>group_by_var</a:t>
+            </a:r>
+            <a:r>
+              <a:rPr lang="en-US" sz="1600" dirty="0">
+                <a:latin typeface="Courier New" panose="02070309020205020404" pitchFamily="49" charset="0"/>
+                <a:cs typeface="Courier New" panose="02070309020205020404" pitchFamily="49" charset="0"/>
+              </a:rPr>
+              <a:t>)</a:t>
+            </a:r>
+          </a:p>
+          <a:p>
+            <a:r>
+              <a:rPr lang="en-US" sz="1600" dirty="0">
+                <a:latin typeface="Courier New" panose="02070309020205020404" pitchFamily="49" charset="0"/>
+                <a:cs typeface="Courier New" panose="02070309020205020404" pitchFamily="49" charset="0"/>
+              </a:rPr>
+              <a:t>   data %&gt;% </a:t>
+            </a:r>
+          </a:p>
+          <a:p>
+            <a:r>
+              <a:rPr lang="en-US" sz="1600" dirty="0">
+                <a:latin typeface="Courier New" panose="02070309020205020404" pitchFamily="49" charset="0"/>
+                <a:cs typeface="Courier New" panose="02070309020205020404" pitchFamily="49" charset="0"/>
+              </a:rPr>
+              <a:t>      count(!!</a:t>
+            </a:r>
+            <a:r>
+              <a:rPr lang="en-US" sz="1600" dirty="0" err="1">
+                <a:latin typeface="Courier New" panose="02070309020205020404" pitchFamily="49" charset="0"/>
+                <a:cs typeface="Courier New" panose="02070309020205020404" pitchFamily="49" charset="0"/>
+              </a:rPr>
+              <a:t>grouping_var</a:t>
+            </a:r>
+            <a:r>
+              <a:rPr lang="en-US" sz="1600" dirty="0">
+                <a:latin typeface="Courier New" panose="02070309020205020404" pitchFamily="49" charset="0"/>
+                <a:cs typeface="Courier New" panose="02070309020205020404" pitchFamily="49" charset="0"/>
+              </a:rPr>
+              <a:t>, …) %&gt;%</a:t>
+            </a:r>
+          </a:p>
+          <a:p>
+            <a:r>
+              <a:rPr lang="en-US" sz="1600" dirty="0">
+                <a:latin typeface="Courier New" panose="02070309020205020404" pitchFamily="49" charset="0"/>
+                <a:cs typeface="Courier New" panose="02070309020205020404" pitchFamily="49" charset="0"/>
+              </a:rPr>
+              <a:t>      </a:t>
+            </a:r>
+            <a:r>
+              <a:rPr lang="en-US" sz="1600" dirty="0" err="1">
+                <a:latin typeface="Courier New" panose="02070309020205020404" pitchFamily="49" charset="0"/>
+                <a:cs typeface="Courier New" panose="02070309020205020404" pitchFamily="49" charset="0"/>
+              </a:rPr>
+              <a:t>group_by</a:t>
+            </a:r>
+            <a:r>
+              <a:rPr lang="en-US" sz="1600" dirty="0">
+                <a:latin typeface="Courier New" panose="02070309020205020404" pitchFamily="49" charset="0"/>
+                <a:cs typeface="Courier New" panose="02070309020205020404" pitchFamily="49" charset="0"/>
+              </a:rPr>
+              <a:t>(!!</a:t>
+            </a:r>
+            <a:r>
+              <a:rPr lang="en-US" sz="1600" dirty="0" err="1">
+                <a:latin typeface="Courier New" panose="02070309020205020404" pitchFamily="49" charset="0"/>
+                <a:cs typeface="Courier New" panose="02070309020205020404" pitchFamily="49" charset="0"/>
+              </a:rPr>
+              <a:t>grouping_var</a:t>
+            </a:r>
+            <a:r>
+              <a:rPr lang="en-US" sz="1600" dirty="0">
+                <a:latin typeface="Courier New" panose="02070309020205020404" pitchFamily="49" charset="0"/>
+                <a:cs typeface="Courier New" panose="02070309020205020404" pitchFamily="49" charset="0"/>
+              </a:rPr>
+              <a:t>) %&gt;%</a:t>
+            </a:r>
+            <a:br>
+              <a:rPr lang="en-US" sz="1600" dirty="0">
+                <a:latin typeface="Courier New" panose="02070309020205020404" pitchFamily="49" charset="0"/>
+                <a:cs typeface="Courier New" panose="02070309020205020404" pitchFamily="49" charset="0"/>
+              </a:rPr>
+            </a:br>
+            <a:r>
+              <a:rPr lang="en-US" sz="1600" dirty="0">
+                <a:latin typeface="Courier New" panose="02070309020205020404" pitchFamily="49" charset="0"/>
+                <a:cs typeface="Courier New" panose="02070309020205020404" pitchFamily="49" charset="0"/>
+              </a:rPr>
+              <a:t>      mutate(</a:t>
+            </a:r>
+            <a:r>
+              <a:rPr lang="en-US" sz="1600" dirty="0" err="1">
+                <a:latin typeface="Courier New" panose="02070309020205020404" pitchFamily="49" charset="0"/>
+                <a:cs typeface="Courier New" panose="02070309020205020404" pitchFamily="49" charset="0"/>
+              </a:rPr>
+              <a:t>prop_col</a:t>
+            </a:r>
+            <a:r>
+              <a:rPr lang="en-US" sz="1600" dirty="0">
+                <a:latin typeface="Courier New" panose="02070309020205020404" pitchFamily="49" charset="0"/>
+                <a:cs typeface="Courier New" panose="02070309020205020404" pitchFamily="49" charset="0"/>
+              </a:rPr>
+              <a:t> = n/sum(n)) %&gt;%</a:t>
+            </a:r>
+          </a:p>
+          <a:p>
+            <a:r>
+              <a:rPr lang="en-US" sz="1600" dirty="0">
+                <a:latin typeface="Courier New" panose="02070309020205020404" pitchFamily="49" charset="0"/>
+                <a:cs typeface="Courier New" panose="02070309020205020404" pitchFamily="49" charset="0"/>
+              </a:rPr>
+              <a:t>      select(-n)</a:t>
+            </a:r>
+          </a:p>
+          <a:p>
+            <a:r>
+              <a:rPr lang="en-US" sz="1600" dirty="0">
+                <a:latin typeface="Courier New" panose="02070309020205020404" pitchFamily="49" charset="0"/>
+                <a:cs typeface="Courier New" panose="02070309020205020404" pitchFamily="49" charset="0"/>
+              </a:rPr>
+              <a:t>}</a:t>
+            </a:r>
+            <a:endParaRPr lang="en-IL" sz="1600" dirty="0">
+              <a:latin typeface="Courier New" panose="02070309020205020404" pitchFamily="49" charset="0"/>
+              <a:cs typeface="Courier New" panose="02070309020205020404" pitchFamily="49" charset="0"/>
+            </a:endParaRPr>
+          </a:p>
+        </p:txBody>
+      </p:sp>
+    </p:spTree>
+    <p:extLst>
+      <p:ext uri="{BB962C8B-B14F-4D97-AF65-F5344CB8AC3E}">
+        <p14:creationId xmlns:p14="http://schemas.microsoft.com/office/powerpoint/2010/main" val="3977583519"/>
+      </p:ext>
+    </p:extLst>
+  </p:cSld>
+  <p:clrMapOvr>
+    <a:masterClrMapping/>
+  </p:clrMapOvr>
+</p:sld>
+</file>
+
+<file path=ppt/slides/slide8.xml><?xml version="1.0" encoding="utf-8"?>
+<p:sld xmlns:a="http://schemas.openxmlformats.org/drawingml/2006/main" xmlns:r="http://schemas.openxmlformats.org/officeDocument/2006/relationships" xmlns:p="http://schemas.openxmlformats.org/presentationml/2006/main">
+  <p:cSld>
+    <p:spTree>
+      <p:nvGrpSpPr>
+        <p:cNvPr id="1" name=""/>
+        <p:cNvGrpSpPr/>
+        <p:nvPr/>
+      </p:nvGrpSpPr>
+      <p:grpSpPr>
+        <a:xfrm>
+          <a:off x="0" y="0"/>
+          <a:ext cx="0" cy="0"/>
+          <a:chOff x="0" y="0"/>
+          <a:chExt cx="0" cy="0"/>
+        </a:xfrm>
+      </p:grpSpPr>
+      <p:sp>
+        <p:nvSpPr>
+          <p:cNvPr id="2" name="Title 1">
+            <a:extLst>
+              <a:ext uri="{FF2B5EF4-FFF2-40B4-BE49-F238E27FC236}">
                 <a16:creationId xmlns:a16="http://schemas.microsoft.com/office/drawing/2014/main" id="{8D5A3CF2-9D8A-4555-8301-91DBFE850697}"/>
               </a:ext>
             </a:extLst>
@@ -9003,7 +9230,7 @@
           <a:p>
             <a:fld id="{4FAB73BC-B049-4115-A692-8D63A059BFB8}" type="slidenum">
               <a:rPr lang="en-US" smtClean="0"/>
-              <a:t>7</a:t>
+              <a:t>8</a:t>
             </a:fld>
             <a:endParaRPr lang="en-US" dirty="0"/>
           </a:p>

</xml_diff>

<commit_message>
Updated the eval/quoted exercise
</commit_message>
<xml_diff>
--- a/presentations/pptx/04-Building tidy functions.pptx
+++ b/presentations/pptx/04-Building tidy functions.pptx
@@ -215,7 +215,7 @@
           <a:p>
             <a:fld id="{5C93CA8F-50F8-44B5-B48F-4C4452AC4FCB}" type="datetimeFigureOut">
               <a:rPr lang="he-IL" smtClean="0"/>
-              <a:t>ב'/ניסן/תשע"ט</a:t>
+              <a:t>י"א/ניסן/תשע"ט</a:t>
             </a:fld>
             <a:endParaRPr lang="he-IL"/>
           </a:p>
@@ -8215,6 +8215,19 @@
               <a:t>(</a:t>
             </a:r>
             <a:r>
+              <a:rPr kumimoji="0" lang="en-IL" altLang="en-IL" sz="1800" b="0" i="0" u="sng" strike="noStrike" cap="none" normalizeH="0" baseline="0" dirty="0">
+                <a:ln>
+                  <a:noFill/>
+                </a:ln>
+                <a:solidFill>
+                  <a:srgbClr val="902000"/>
+                </a:solidFill>
+                <a:effectLst/>
+                <a:latin typeface="Consolas" panose="020B0609020204030204" pitchFamily="49" charset="0"/>
+              </a:rPr>
+              <a:t>mean</a:t>
+            </a:r>
+            <a:r>
               <a:rPr kumimoji="0" lang="en-IL" altLang="en-IL" sz="1800" b="0" i="0" u="none" strike="noStrike" cap="none" normalizeH="0" baseline="0" dirty="0">
                 <a:ln>
                   <a:noFill/>
@@ -8225,7 +8238,7 @@
                 <a:effectLst/>
                 <a:latin typeface="Consolas" panose="020B0609020204030204" pitchFamily="49" charset="0"/>
               </a:rPr>
-              <a:t>mean =</a:t>
+              <a:t> =</a:t>
             </a:r>
             <a:r>
               <a:rPr kumimoji="0" lang="en-IL" altLang="en-IL" sz="1800" b="0" i="0" u="none" strike="noStrike" cap="none" normalizeH="0" baseline="0" dirty="0">

</xml_diff>